<commit_message>
Adicionar tela de fundo do dashboard
design: adicionar a tela de fundo da página do projeto
</commit_message>
<xml_diff>
--- a/design/model-screen.pptx
+++ b/design/model-screen.pptx
@@ -104,7 +104,233 @@
       </a:defRPr>
     </a:lvl9pPr>
   </p:defaultTextStyle>
+  <p:extLst>
+    <p:ext uri="{EFAFB233-063F-42B5-8137-9DF3F51BA10A}">
+      <p15:sldGuideLst xmlns:p15="http://schemas.microsoft.com/office/powerpoint/2012/main"/>
+    </p:ext>
+  </p:extLst>
 </p:presentation>
+</file>
+
+<file path=ppt/revisionInfo.xml><?xml version="1.0" encoding="utf-8"?>
+<p1510:revInfo xmlns:a="http://schemas.openxmlformats.org/drawingml/2006/main" xmlns:r="http://schemas.openxmlformats.org/officeDocument/2006/relationships" xmlns:p1510="http://schemas.microsoft.com/office/powerpoint/2015/10/main">
+  <p1510:revLst>
+    <p1510:client id="{5CCABF1A-AC3E-49EE-9F46-3834C89674B3}" v="13" dt="2026-01-23T17:43:44.170"/>
+  </p1510:revLst>
+</p1510:revInfo>
+</file>
+
+<file path=ppt/changesInfos/changesInfo1.xml><?xml version="1.0" encoding="utf-8"?>
+<pc:chgInfo xmlns:a="http://schemas.openxmlformats.org/drawingml/2006/main" xmlns:r="http://schemas.openxmlformats.org/officeDocument/2006/relationships" xmlns:ac="http://schemas.microsoft.com/office/drawing/2013/main/command" xmlns:pc="http://schemas.microsoft.com/office/powerpoint/2013/main/command">
+  <pc:docChgLst>
+    <pc:chgData name="Matheus Ferreira" userId="6812419b9d4db205" providerId="LiveId" clId="{3686751A-7E85-438C-A520-65A5FC13965D}"/>
+    <pc:docChg chg="undo custSel modSld">
+      <pc:chgData name="Matheus Ferreira" userId="6812419b9d4db205" providerId="LiveId" clId="{3686751A-7E85-438C-A520-65A5FC13965D}" dt="2026-01-23T17:44:31.571" v="137" actId="1076"/>
+      <pc:docMkLst>
+        <pc:docMk/>
+      </pc:docMkLst>
+      <pc:sldChg chg="addSp delSp modSp mod">
+        <pc:chgData name="Matheus Ferreira" userId="6812419b9d4db205" providerId="LiveId" clId="{3686751A-7E85-438C-A520-65A5FC13965D}" dt="2026-01-23T17:44:31.571" v="137" actId="1076"/>
+        <pc:sldMkLst>
+          <pc:docMk/>
+          <pc:sldMk cId="3211902230" sldId="256"/>
+        </pc:sldMkLst>
+        <pc:spChg chg="mod">
+          <ac:chgData name="Matheus Ferreira" userId="6812419b9d4db205" providerId="LiveId" clId="{3686751A-7E85-438C-A520-65A5FC13965D}" dt="2026-01-23T17:31:41.478" v="97" actId="14100"/>
+          <ac:spMkLst>
+            <pc:docMk/>
+            <pc:sldMk cId="3211902230" sldId="256"/>
+            <ac:spMk id="4" creationId="{7A36E647-5797-077C-F2A7-FE0100EBE188}"/>
+          </ac:spMkLst>
+        </pc:spChg>
+        <pc:spChg chg="add mod">
+          <ac:chgData name="Matheus Ferreira" userId="6812419b9d4db205" providerId="LiveId" clId="{3686751A-7E85-438C-A520-65A5FC13965D}" dt="2026-01-23T17:15:18.824" v="5" actId="14861"/>
+          <ac:spMkLst>
+            <pc:docMk/>
+            <pc:sldMk cId="3211902230" sldId="256"/>
+            <ac:spMk id="5" creationId="{FDF23EF4-654F-03AF-7E28-4C3DDDBEECED}"/>
+          </ac:spMkLst>
+        </pc:spChg>
+        <pc:spChg chg="add del mod">
+          <ac:chgData name="Matheus Ferreira" userId="6812419b9d4db205" providerId="LiveId" clId="{3686751A-7E85-438C-A520-65A5FC13965D}" dt="2026-01-23T17:21:59.120" v="41" actId="478"/>
+          <ac:spMkLst>
+            <pc:docMk/>
+            <pc:sldMk cId="3211902230" sldId="256"/>
+            <ac:spMk id="6" creationId="{3E83028B-E9BF-A60F-7132-3F2A5FD694C0}"/>
+          </ac:spMkLst>
+        </pc:spChg>
+        <pc:spChg chg="add del mod">
+          <ac:chgData name="Matheus Ferreira" userId="6812419b9d4db205" providerId="LiveId" clId="{3686751A-7E85-438C-A520-65A5FC13965D}" dt="2026-01-23T17:26:07.730" v="66" actId="478"/>
+          <ac:spMkLst>
+            <pc:docMk/>
+            <pc:sldMk cId="3211902230" sldId="256"/>
+            <ac:spMk id="11" creationId="{86B2DBD3-49F8-964E-1D4C-42B5F9199D4B}"/>
+          </ac:spMkLst>
+        </pc:spChg>
+        <pc:spChg chg="add mod">
+          <ac:chgData name="Matheus Ferreira" userId="6812419b9d4db205" providerId="LiveId" clId="{3686751A-7E85-438C-A520-65A5FC13965D}" dt="2026-01-23T17:26:41.066" v="74" actId="14100"/>
+          <ac:spMkLst>
+            <pc:docMk/>
+            <pc:sldMk cId="3211902230" sldId="256"/>
+            <ac:spMk id="12" creationId="{193178A6-418E-8776-FB03-642B0FF05616}"/>
+          </ac:spMkLst>
+        </pc:spChg>
+        <pc:spChg chg="add mod">
+          <ac:chgData name="Matheus Ferreira" userId="6812419b9d4db205" providerId="LiveId" clId="{3686751A-7E85-438C-A520-65A5FC13965D}" dt="2026-01-23T17:27:48.920" v="85" actId="207"/>
+          <ac:spMkLst>
+            <pc:docMk/>
+            <pc:sldMk cId="3211902230" sldId="256"/>
+            <ac:spMk id="13" creationId="{1091B80A-64F8-04D8-6D1A-9A28EB87655D}"/>
+          </ac:spMkLst>
+        </pc:spChg>
+        <pc:spChg chg="add mod">
+          <ac:chgData name="Matheus Ferreira" userId="6812419b9d4db205" providerId="LiveId" clId="{3686751A-7E85-438C-A520-65A5FC13965D}" dt="2026-01-23T17:27:20.385" v="81" actId="207"/>
+          <ac:spMkLst>
+            <pc:docMk/>
+            <pc:sldMk cId="3211902230" sldId="256"/>
+            <ac:spMk id="14" creationId="{0509D012-2256-CCCA-E2E0-5091216D59C5}"/>
+          </ac:spMkLst>
+        </pc:spChg>
+        <pc:spChg chg="add mod">
+          <ac:chgData name="Matheus Ferreira" userId="6812419b9d4db205" providerId="LiveId" clId="{3686751A-7E85-438C-A520-65A5FC13965D}" dt="2026-01-23T17:27:41.367" v="84" actId="207"/>
+          <ac:spMkLst>
+            <pc:docMk/>
+            <pc:sldMk cId="3211902230" sldId="256"/>
+            <ac:spMk id="15" creationId="{3A1D6D8D-EC66-921E-FF4C-6A3A22C8565A}"/>
+          </ac:spMkLst>
+        </pc:spChg>
+        <pc:spChg chg="mod">
+          <ac:chgData name="Matheus Ferreira" userId="6812419b9d4db205" providerId="LiveId" clId="{3686751A-7E85-438C-A520-65A5FC13965D}" dt="2026-01-23T17:23:22.661" v="51" actId="14861"/>
+          <ac:spMkLst>
+            <pc:docMk/>
+            <pc:sldMk cId="3211902230" sldId="256"/>
+            <ac:spMk id="19" creationId="{A200E135-D7BA-F484-E5DC-84C5D8CCCACF}"/>
+          </ac:spMkLst>
+        </pc:spChg>
+        <pc:spChg chg="mod">
+          <ac:chgData name="Matheus Ferreira" userId="6812419b9d4db205" providerId="LiveId" clId="{3686751A-7E85-438C-A520-65A5FC13965D}" dt="2026-01-23T17:23:29.939" v="52" actId="108"/>
+          <ac:spMkLst>
+            <pc:docMk/>
+            <pc:sldMk cId="3211902230" sldId="256"/>
+            <ac:spMk id="20" creationId="{C57C9619-849C-7A82-6796-C940B23E7948}"/>
+          </ac:spMkLst>
+        </pc:spChg>
+        <pc:spChg chg="mod">
+          <ac:chgData name="Matheus Ferreira" userId="6812419b9d4db205" providerId="LiveId" clId="{3686751A-7E85-438C-A520-65A5FC13965D}" dt="2026-01-23T17:23:32.177" v="53" actId="108"/>
+          <ac:spMkLst>
+            <pc:docMk/>
+            <pc:sldMk cId="3211902230" sldId="256"/>
+            <ac:spMk id="21" creationId="{1491B325-6D5C-F03D-3650-D3B152816631}"/>
+          </ac:spMkLst>
+        </pc:spChg>
+        <pc:spChg chg="mod">
+          <ac:chgData name="Matheus Ferreira" userId="6812419b9d4db205" providerId="LiveId" clId="{3686751A-7E85-438C-A520-65A5FC13965D}" dt="2026-01-23T17:23:35.572" v="54" actId="108"/>
+          <ac:spMkLst>
+            <pc:docMk/>
+            <pc:sldMk cId="3211902230" sldId="256"/>
+            <ac:spMk id="22" creationId="{29EE5F54-34FA-24B9-DF82-A5A43E0D902E}"/>
+          </ac:spMkLst>
+        </pc:spChg>
+        <pc:spChg chg="mod">
+          <ac:chgData name="Matheus Ferreira" userId="6812419b9d4db205" providerId="LiveId" clId="{3686751A-7E85-438C-A520-65A5FC13965D}" dt="2026-01-23T17:28:31.229" v="89" actId="1076"/>
+          <ac:spMkLst>
+            <pc:docMk/>
+            <pc:sldMk cId="3211902230" sldId="256"/>
+            <ac:spMk id="23" creationId="{9A39DADC-8AB9-4D96-8FC6-DA736ED29262}"/>
+          </ac:spMkLst>
+        </pc:spChg>
+        <pc:spChg chg="mod">
+          <ac:chgData name="Matheus Ferreira" userId="6812419b9d4db205" providerId="LiveId" clId="{3686751A-7E85-438C-A520-65A5FC13965D}" dt="2026-01-23T17:23:48.927" v="57" actId="108"/>
+          <ac:spMkLst>
+            <pc:docMk/>
+            <pc:sldMk cId="3211902230" sldId="256"/>
+            <ac:spMk id="24" creationId="{735E4238-5543-8048-B66A-DE344466C13F}"/>
+          </ac:spMkLst>
+        </pc:spChg>
+        <pc:spChg chg="mod">
+          <ac:chgData name="Matheus Ferreira" userId="6812419b9d4db205" providerId="LiveId" clId="{3686751A-7E85-438C-A520-65A5FC13965D}" dt="2026-01-23T17:40:12.035" v="125" actId="1076"/>
+          <ac:spMkLst>
+            <pc:docMk/>
+            <pc:sldMk cId="3211902230" sldId="256"/>
+            <ac:spMk id="25" creationId="{66AA8764-E26E-37F4-7950-77C82C4A844B}"/>
+          </ac:spMkLst>
+        </pc:spChg>
+        <pc:picChg chg="add del mod">
+          <ac:chgData name="Matheus Ferreira" userId="6812419b9d4db205" providerId="LiveId" clId="{3686751A-7E85-438C-A520-65A5FC13965D}" dt="2026-01-23T17:20:33.607" v="31" actId="478"/>
+          <ac:picMkLst>
+            <pc:docMk/>
+            <pc:sldMk cId="3211902230" sldId="256"/>
+            <ac:picMk id="8" creationId="{021C19D6-BBB2-9A1F-6FC8-CC88EBD9488C}"/>
+          </ac:picMkLst>
+        </pc:picChg>
+        <pc:picChg chg="add mod">
+          <ac:chgData name="Matheus Ferreira" userId="6812419b9d4db205" providerId="LiveId" clId="{3686751A-7E85-438C-A520-65A5FC13965D}" dt="2026-01-23T17:21:48.224" v="40" actId="207"/>
+          <ac:picMkLst>
+            <pc:docMk/>
+            <pc:sldMk cId="3211902230" sldId="256"/>
+            <ac:picMk id="10" creationId="{A81F43D0-192E-7BBF-84A9-864BA7209015}"/>
+          </ac:picMkLst>
+        </pc:picChg>
+        <pc:picChg chg="add del mod">
+          <ac:chgData name="Matheus Ferreira" userId="6812419b9d4db205" providerId="LiveId" clId="{3686751A-7E85-438C-A520-65A5FC13965D}" dt="2026-01-23T17:31:33.022" v="95" actId="478"/>
+          <ac:picMkLst>
+            <pc:docMk/>
+            <pc:sldMk cId="3211902230" sldId="256"/>
+            <ac:picMk id="17" creationId="{0255FF50-FD62-8A02-46AF-31803F005E79}"/>
+          </ac:picMkLst>
+        </pc:picChg>
+        <pc:picChg chg="add del mod">
+          <ac:chgData name="Matheus Ferreira" userId="6812419b9d4db205" providerId="LiveId" clId="{3686751A-7E85-438C-A520-65A5FC13965D}" dt="2026-01-23T17:35:55.383" v="113" actId="478"/>
+          <ac:picMkLst>
+            <pc:docMk/>
+            <pc:sldMk cId="3211902230" sldId="256"/>
+            <ac:picMk id="26" creationId="{F0E398E4-940C-6BF1-7829-7A8524FF276B}"/>
+          </ac:picMkLst>
+        </pc:picChg>
+        <pc:picChg chg="add mod">
+          <ac:chgData name="Matheus Ferreira" userId="6812419b9d4db205" providerId="LiveId" clId="{3686751A-7E85-438C-A520-65A5FC13965D}" dt="2026-01-23T17:41:12.656" v="130" actId="1076"/>
+          <ac:picMkLst>
+            <pc:docMk/>
+            <pc:sldMk cId="3211902230" sldId="256"/>
+            <ac:picMk id="28" creationId="{16CA6C13-6848-D7AC-1F43-D0D169DEA8B1}"/>
+          </ac:picMkLst>
+        </pc:picChg>
+        <pc:picChg chg="add mod">
+          <ac:chgData name="Matheus Ferreira" userId="6812419b9d4db205" providerId="LiveId" clId="{3686751A-7E85-438C-A520-65A5FC13965D}" dt="2026-01-23T17:36:37.857" v="115" actId="207"/>
+          <ac:picMkLst>
+            <pc:docMk/>
+            <pc:sldMk cId="3211902230" sldId="256"/>
+            <ac:picMk id="30" creationId="{5F9EF103-BCA5-8B76-FA2D-48E87D81C1C2}"/>
+          </ac:picMkLst>
+        </pc:picChg>
+        <pc:picChg chg="add del mod">
+          <ac:chgData name="Matheus Ferreira" userId="6812419b9d4db205" providerId="LiveId" clId="{3686751A-7E85-438C-A520-65A5FC13965D}" dt="2026-01-23T17:39:22.385" v="122" actId="478"/>
+          <ac:picMkLst>
+            <pc:docMk/>
+            <pc:sldMk cId="3211902230" sldId="256"/>
+            <ac:picMk id="32" creationId="{CE759AF5-7F25-E3F5-49B6-8DBE990F4CB0}"/>
+          </ac:picMkLst>
+        </pc:picChg>
+        <pc:picChg chg="add mod">
+          <ac:chgData name="Matheus Ferreira" userId="6812419b9d4db205" providerId="LiveId" clId="{3686751A-7E85-438C-A520-65A5FC13965D}" dt="2026-01-23T17:40:30.165" v="129" actId="1076"/>
+          <ac:picMkLst>
+            <pc:docMk/>
+            <pc:sldMk cId="3211902230" sldId="256"/>
+            <ac:picMk id="34" creationId="{70777EA6-23D7-7740-C7C9-D2C5DFBA347F}"/>
+          </ac:picMkLst>
+        </pc:picChg>
+        <pc:picChg chg="add mod">
+          <ac:chgData name="Matheus Ferreira" userId="6812419b9d4db205" providerId="LiveId" clId="{3686751A-7E85-438C-A520-65A5FC13965D}" dt="2026-01-23T17:44:31.571" v="137" actId="1076"/>
+          <ac:picMkLst>
+            <pc:docMk/>
+            <pc:sldMk cId="3211902230" sldId="256"/>
+            <ac:picMk id="36" creationId="{B8FF45AD-27EF-4AE9-507C-96E9EA0C6724}"/>
+          </ac:picMkLst>
+        </pc:picChg>
+      </pc:sldChg>
+    </pc:docChg>
+  </pc:docChgLst>
+</pc:chgInfo>
 </file>
 
 <file path=ppt/slideLayouts/slideLayout1.xml><?xml version="1.0" encoding="utf-8"?>
@@ -254,7 +480,7 @@
           <a:p>
             <a:fld id="{5A085AF4-6350-4827-A616-925DAD233DD0}" type="datetimeFigureOut">
               <a:rPr lang="pt-BR" smtClean="0"/>
-              <a:t>22/01/2026</a:t>
+              <a:t>23/01/2026</a:t>
             </a:fld>
             <a:endParaRPr lang="pt-BR"/>
           </a:p>
@@ -452,7 +678,7 @@
           <a:p>
             <a:fld id="{5A085AF4-6350-4827-A616-925DAD233DD0}" type="datetimeFigureOut">
               <a:rPr lang="pt-BR" smtClean="0"/>
-              <a:t>22/01/2026</a:t>
+              <a:t>23/01/2026</a:t>
             </a:fld>
             <a:endParaRPr lang="pt-BR"/>
           </a:p>
@@ -660,7 +886,7 @@
           <a:p>
             <a:fld id="{5A085AF4-6350-4827-A616-925DAD233DD0}" type="datetimeFigureOut">
               <a:rPr lang="pt-BR" smtClean="0"/>
-              <a:t>22/01/2026</a:t>
+              <a:t>23/01/2026</a:t>
             </a:fld>
             <a:endParaRPr lang="pt-BR"/>
           </a:p>
@@ -858,7 +1084,7 @@
           <a:p>
             <a:fld id="{5A085AF4-6350-4827-A616-925DAD233DD0}" type="datetimeFigureOut">
               <a:rPr lang="pt-BR" smtClean="0"/>
-              <a:t>22/01/2026</a:t>
+              <a:t>23/01/2026</a:t>
             </a:fld>
             <a:endParaRPr lang="pt-BR"/>
           </a:p>
@@ -1133,7 +1359,7 @@
           <a:p>
             <a:fld id="{5A085AF4-6350-4827-A616-925DAD233DD0}" type="datetimeFigureOut">
               <a:rPr lang="pt-BR" smtClean="0"/>
-              <a:t>22/01/2026</a:t>
+              <a:t>23/01/2026</a:t>
             </a:fld>
             <a:endParaRPr lang="pt-BR"/>
           </a:p>
@@ -1398,7 +1624,7 @@
           <a:p>
             <a:fld id="{5A085AF4-6350-4827-A616-925DAD233DD0}" type="datetimeFigureOut">
               <a:rPr lang="pt-BR" smtClean="0"/>
-              <a:t>22/01/2026</a:t>
+              <a:t>23/01/2026</a:t>
             </a:fld>
             <a:endParaRPr lang="pt-BR"/>
           </a:p>
@@ -1810,7 +2036,7 @@
           <a:p>
             <a:fld id="{5A085AF4-6350-4827-A616-925DAD233DD0}" type="datetimeFigureOut">
               <a:rPr lang="pt-BR" smtClean="0"/>
-              <a:t>22/01/2026</a:t>
+              <a:t>23/01/2026</a:t>
             </a:fld>
             <a:endParaRPr lang="pt-BR"/>
           </a:p>
@@ -1951,7 +2177,7 @@
           <a:p>
             <a:fld id="{5A085AF4-6350-4827-A616-925DAD233DD0}" type="datetimeFigureOut">
               <a:rPr lang="pt-BR" smtClean="0"/>
-              <a:t>22/01/2026</a:t>
+              <a:t>23/01/2026</a:t>
             </a:fld>
             <a:endParaRPr lang="pt-BR"/>
           </a:p>
@@ -2064,7 +2290,7 @@
           <a:p>
             <a:fld id="{5A085AF4-6350-4827-A616-925DAD233DD0}" type="datetimeFigureOut">
               <a:rPr lang="pt-BR" smtClean="0"/>
-              <a:t>22/01/2026</a:t>
+              <a:t>23/01/2026</a:t>
             </a:fld>
             <a:endParaRPr lang="pt-BR"/>
           </a:p>
@@ -2375,7 +2601,7 @@
           <a:p>
             <a:fld id="{5A085AF4-6350-4827-A616-925DAD233DD0}" type="datetimeFigureOut">
               <a:rPr lang="pt-BR" smtClean="0"/>
-              <a:t>22/01/2026</a:t>
+              <a:t>23/01/2026</a:t>
             </a:fld>
             <a:endParaRPr lang="pt-BR"/>
           </a:p>
@@ -2663,7 +2889,7 @@
           <a:p>
             <a:fld id="{5A085AF4-6350-4827-A616-925DAD233DD0}" type="datetimeFigureOut">
               <a:rPr lang="pt-BR" smtClean="0"/>
-              <a:t>22/01/2026</a:t>
+              <a:t>23/01/2026</a:t>
             </a:fld>
             <a:endParaRPr lang="pt-BR"/>
           </a:p>
@@ -2904,7 +3130,7 @@
           <a:p>
             <a:fld id="{5A085AF4-6350-4827-A616-925DAD233DD0}" type="datetimeFigureOut">
               <a:rPr lang="pt-BR" smtClean="0"/>
-              <a:t>22/01/2026</a:t>
+              <a:t>23/01/2026</a:t>
             </a:fld>
             <a:endParaRPr lang="pt-BR"/>
           </a:p>
@@ -3442,7 +3668,7 @@
           </a:xfrm>
           <a:prstGeom prst="roundRect">
             <a:avLst>
-              <a:gd name="adj" fmla="val 6533"/>
+              <a:gd name="adj" fmla="val 0"/>
             </a:avLst>
           </a:prstGeom>
           <a:solidFill>
@@ -3452,10 +3678,9 @@
             <a:noFill/>
           </a:ln>
           <a:effectLst>
-            <a:outerShdw blurRad="50800" dist="38100" dir="2700000" algn="tl" rotWithShape="0">
-              <a:schemeClr val="tx1">
+            <a:outerShdw blurRad="50800" dist="38100" dir="5400000" algn="t" rotWithShape="0">
+              <a:schemeClr val="bg1">
                 <a:lumMod val="50000"/>
-                <a:lumOff val="50000"/>
                 <a:alpha val="25000"/>
               </a:schemeClr>
             </a:outerShdw>
@@ -3505,7 +3730,7 @@
           </a:xfrm>
           <a:prstGeom prst="roundRect">
             <a:avLst>
-              <a:gd name="adj" fmla="val 6533"/>
+              <a:gd name="adj" fmla="val 0"/>
             </a:avLst>
           </a:prstGeom>
           <a:solidFill>
@@ -3515,10 +3740,9 @@
             <a:noFill/>
           </a:ln>
           <a:effectLst>
-            <a:outerShdw blurRad="50800" dist="38100" dir="2700000" algn="tl" rotWithShape="0">
-              <a:schemeClr val="tx1">
+            <a:outerShdw blurRad="50800" dist="38100" dir="5400000" algn="t" rotWithShape="0">
+              <a:schemeClr val="bg1">
                 <a:lumMod val="50000"/>
-                <a:lumOff val="50000"/>
                 <a:alpha val="25000"/>
               </a:schemeClr>
             </a:outerShdw>
@@ -3568,7 +3792,7 @@
           </a:xfrm>
           <a:prstGeom prst="roundRect">
             <a:avLst>
-              <a:gd name="adj" fmla="val 6533"/>
+              <a:gd name="adj" fmla="val 0"/>
             </a:avLst>
           </a:prstGeom>
           <a:solidFill>
@@ -3578,10 +3802,9 @@
             <a:noFill/>
           </a:ln>
           <a:effectLst>
-            <a:outerShdw blurRad="50800" dist="38100" dir="2700000" algn="tl" rotWithShape="0">
-              <a:schemeClr val="tx1">
+            <a:outerShdw blurRad="50800" dist="38100" dir="5400000" algn="t" rotWithShape="0">
+              <a:schemeClr val="bg1">
                 <a:lumMod val="50000"/>
-                <a:lumOff val="50000"/>
                 <a:alpha val="25000"/>
               </a:schemeClr>
             </a:outerShdw>
@@ -3631,7 +3854,7 @@
           </a:xfrm>
           <a:prstGeom prst="roundRect">
             <a:avLst>
-              <a:gd name="adj" fmla="val 6533"/>
+              <a:gd name="adj" fmla="val 132"/>
             </a:avLst>
           </a:prstGeom>
           <a:solidFill>
@@ -3641,10 +3864,9 @@
             <a:noFill/>
           </a:ln>
           <a:effectLst>
-            <a:outerShdw blurRad="50800" dist="38100" dir="2700000" algn="tl" rotWithShape="0">
-              <a:schemeClr val="tx1">
+            <a:outerShdw blurRad="50800" dist="38100" dir="5400000" algn="t" rotWithShape="0">
+              <a:schemeClr val="bg1">
                 <a:lumMod val="50000"/>
-                <a:lumOff val="50000"/>
                 <a:alpha val="25000"/>
               </a:schemeClr>
             </a:outerShdw>
@@ -3704,10 +3926,9 @@
             <a:noFill/>
           </a:ln>
           <a:effectLst>
-            <a:outerShdw blurRad="50800" dist="38100" dir="2700000" algn="tl" rotWithShape="0">
-              <a:schemeClr val="tx1">
-                <a:lumMod val="50000"/>
-                <a:lumOff val="50000"/>
+            <a:outerShdw blurRad="50800" dist="38100" dir="5400000" algn="t" rotWithShape="0">
+              <a:schemeClr val="bg1">
+                <a:lumMod val="65000"/>
                 <a:alpha val="25000"/>
               </a:schemeClr>
             </a:outerShdw>
@@ -3767,10 +3988,9 @@
             <a:noFill/>
           </a:ln>
           <a:effectLst>
-            <a:outerShdw blurRad="50800" dist="38100" dir="2700000" algn="tl" rotWithShape="0">
-              <a:schemeClr val="tx1">
+            <a:outerShdw blurRad="50800" dist="38100" dir="5400000" algn="t" rotWithShape="0">
+              <a:schemeClr val="bg1">
                 <a:lumMod val="50000"/>
-                <a:lumOff val="50000"/>
                 <a:alpha val="25000"/>
               </a:schemeClr>
             </a:outerShdw>
@@ -3830,10 +4050,9 @@
             <a:noFill/>
           </a:ln>
           <a:effectLst>
-            <a:outerShdw blurRad="50800" dist="38100" dir="2700000" algn="tl" rotWithShape="0">
-              <a:schemeClr val="tx1">
+            <a:outerShdw blurRad="50800" dist="38100" dir="5400000" algn="t" rotWithShape="0">
+              <a:schemeClr val="bg1">
                 <a:lumMod val="50000"/>
-                <a:lumOff val="50000"/>
                 <a:alpha val="25000"/>
               </a:schemeClr>
             </a:outerShdw>
@@ -3864,6 +4083,471 @@
           </a:p>
         </p:txBody>
       </p:sp>
+      <p:sp>
+        <p:nvSpPr>
+          <p:cNvPr id="5" name="Retângulo: Cantos Arredondados 4">
+            <a:extLst>
+              <a:ext uri="{FF2B5EF4-FFF2-40B4-BE49-F238E27FC236}">
+                <a16:creationId xmlns:a16="http://schemas.microsoft.com/office/drawing/2014/main" id="{FDF23EF4-654F-03AF-7E28-4C3DDDBEECED}"/>
+              </a:ext>
+            </a:extLst>
+          </p:cNvPr>
+          <p:cNvSpPr/>
+          <p:nvPr/>
+        </p:nvSpPr>
+        <p:spPr>
+          <a:xfrm>
+            <a:off x="0" y="0"/>
+            <a:ext cx="12068250" cy="588725"/>
+          </a:xfrm>
+          <a:prstGeom prst="roundRect">
+            <a:avLst>
+              <a:gd name="adj" fmla="val 6533"/>
+            </a:avLst>
+          </a:prstGeom>
+          <a:solidFill>
+            <a:schemeClr val="bg1"/>
+          </a:solidFill>
+          <a:ln>
+            <a:noFill/>
+          </a:ln>
+          <a:effectLst>
+            <a:outerShdw blurRad="50800" dist="38100" dir="2700000" algn="tl" rotWithShape="0">
+              <a:schemeClr val="tx1">
+                <a:lumMod val="50000"/>
+                <a:lumOff val="50000"/>
+                <a:alpha val="10000"/>
+              </a:schemeClr>
+            </a:outerShdw>
+          </a:effectLst>
+        </p:spPr>
+        <p:style>
+          <a:lnRef idx="2">
+            <a:schemeClr val="accent1">
+              <a:shade val="15000"/>
+            </a:schemeClr>
+          </a:lnRef>
+          <a:fillRef idx="1">
+            <a:schemeClr val="accent1"/>
+          </a:fillRef>
+          <a:effectRef idx="0">
+            <a:schemeClr val="accent1"/>
+          </a:effectRef>
+          <a:fontRef idx="minor">
+            <a:schemeClr val="lt1"/>
+          </a:fontRef>
+        </p:style>
+        <p:txBody>
+          <a:bodyPr rtlCol="0" anchor="ctr"/>
+          <a:lstStyle/>
+          <a:p>
+            <a:pPr algn="ctr"/>
+            <a:endParaRPr lang="pt-BR"/>
+          </a:p>
+        </p:txBody>
+      </p:sp>
+      <p:pic>
+        <p:nvPicPr>
+          <p:cNvPr id="10" name="Gráfico 9" descr="Pegadas de sapato estrutura de tópicos">
+            <a:extLst>
+              <a:ext uri="{FF2B5EF4-FFF2-40B4-BE49-F238E27FC236}">
+                <a16:creationId xmlns:a16="http://schemas.microsoft.com/office/drawing/2014/main" id="{A81F43D0-192E-7BBF-84A9-864BA7209015}"/>
+              </a:ext>
+            </a:extLst>
+          </p:cNvPr>
+          <p:cNvPicPr>
+            <a:picLocks noChangeAspect="1"/>
+          </p:cNvPicPr>
+          <p:nvPr/>
+        </p:nvPicPr>
+        <p:blipFill>
+          <a:blip r:embed="rId2">
+            <a:extLst>
+              <a:ext uri="{96DAC541-7B7A-43D3-8B79-37D633B846F1}">
+                <asvg:svgBlip xmlns:asvg="http://schemas.microsoft.com/office/drawing/2016/SVG/main" r:embed="rId3"/>
+              </a:ext>
+            </a:extLst>
+          </a:blip>
+          <a:stretch>
+            <a:fillRect/>
+          </a:stretch>
+        </p:blipFill>
+        <p:spPr>
+          <a:xfrm>
+            <a:off x="2753353" y="803709"/>
+            <a:ext cx="241308" cy="241308"/>
+          </a:xfrm>
+          <a:prstGeom prst="rect">
+            <a:avLst/>
+          </a:prstGeom>
+        </p:spPr>
+      </p:pic>
+      <p:sp>
+        <p:nvSpPr>
+          <p:cNvPr id="12" name="Retângulo: Único Canto Arredondado 11">
+            <a:extLst>
+              <a:ext uri="{FF2B5EF4-FFF2-40B4-BE49-F238E27FC236}">
+                <a16:creationId xmlns:a16="http://schemas.microsoft.com/office/drawing/2014/main" id="{193178A6-418E-8776-FB03-642B0FF05616}"/>
+              </a:ext>
+            </a:extLst>
+          </p:cNvPr>
+          <p:cNvSpPr/>
+          <p:nvPr/>
+        </p:nvSpPr>
+        <p:spPr>
+          <a:xfrm rot="10800000">
+            <a:off x="2679589" y="767131"/>
+            <a:ext cx="402162" cy="277886"/>
+          </a:xfrm>
+          <a:prstGeom prst="round1Rect">
+            <a:avLst>
+              <a:gd name="adj" fmla="val 45280"/>
+            </a:avLst>
+          </a:prstGeom>
+          <a:solidFill>
+            <a:srgbClr val="25BDF3"/>
+          </a:solidFill>
+          <a:ln>
+            <a:noFill/>
+          </a:ln>
+        </p:spPr>
+        <p:style>
+          <a:lnRef idx="2">
+            <a:schemeClr val="accent1">
+              <a:shade val="15000"/>
+            </a:schemeClr>
+          </a:lnRef>
+          <a:fillRef idx="1">
+            <a:schemeClr val="accent1"/>
+          </a:fillRef>
+          <a:effectRef idx="0">
+            <a:schemeClr val="accent1"/>
+          </a:effectRef>
+          <a:fontRef idx="minor">
+            <a:schemeClr val="lt1"/>
+          </a:fontRef>
+        </p:style>
+        <p:txBody>
+          <a:bodyPr rtlCol="0" anchor="ctr"/>
+          <a:lstStyle/>
+          <a:p>
+            <a:pPr algn="ctr"/>
+            <a:endParaRPr lang="pt-BR"/>
+          </a:p>
+        </p:txBody>
+      </p:sp>
+      <p:sp>
+        <p:nvSpPr>
+          <p:cNvPr id="13" name="Retângulo: Único Canto Arredondado 12">
+            <a:extLst>
+              <a:ext uri="{FF2B5EF4-FFF2-40B4-BE49-F238E27FC236}">
+                <a16:creationId xmlns:a16="http://schemas.microsoft.com/office/drawing/2014/main" id="{1091B80A-64F8-04D8-6D1A-9A28EB87655D}"/>
+              </a:ext>
+            </a:extLst>
+          </p:cNvPr>
+          <p:cNvSpPr/>
+          <p:nvPr/>
+        </p:nvSpPr>
+        <p:spPr>
+          <a:xfrm rot="10800000">
+            <a:off x="5684837" y="757427"/>
+            <a:ext cx="402162" cy="277886"/>
+          </a:xfrm>
+          <a:prstGeom prst="round1Rect">
+            <a:avLst>
+              <a:gd name="adj" fmla="val 45280"/>
+            </a:avLst>
+          </a:prstGeom>
+          <a:solidFill>
+            <a:schemeClr val="bg1">
+              <a:lumMod val="65000"/>
+            </a:schemeClr>
+          </a:solidFill>
+          <a:ln>
+            <a:noFill/>
+          </a:ln>
+        </p:spPr>
+        <p:style>
+          <a:lnRef idx="2">
+            <a:schemeClr val="accent1">
+              <a:shade val="15000"/>
+            </a:schemeClr>
+          </a:lnRef>
+          <a:fillRef idx="1">
+            <a:schemeClr val="accent1"/>
+          </a:fillRef>
+          <a:effectRef idx="0">
+            <a:schemeClr val="accent1"/>
+          </a:effectRef>
+          <a:fontRef idx="minor">
+            <a:schemeClr val="lt1"/>
+          </a:fontRef>
+        </p:style>
+        <p:txBody>
+          <a:bodyPr rtlCol="0" anchor="ctr"/>
+          <a:lstStyle/>
+          <a:p>
+            <a:pPr algn="ctr"/>
+            <a:endParaRPr lang="pt-BR" dirty="0"/>
+          </a:p>
+        </p:txBody>
+      </p:sp>
+      <p:sp>
+        <p:nvSpPr>
+          <p:cNvPr id="14" name="Retângulo: Único Canto Arredondado 13">
+            <a:extLst>
+              <a:ext uri="{FF2B5EF4-FFF2-40B4-BE49-F238E27FC236}">
+                <a16:creationId xmlns:a16="http://schemas.microsoft.com/office/drawing/2014/main" id="{0509D012-2256-CCCA-E2E0-5091216D59C5}"/>
+              </a:ext>
+            </a:extLst>
+          </p:cNvPr>
+          <p:cNvSpPr/>
+          <p:nvPr/>
+        </p:nvSpPr>
+        <p:spPr>
+          <a:xfrm rot="10800000">
+            <a:off x="8692339" y="757427"/>
+            <a:ext cx="402162" cy="277886"/>
+          </a:xfrm>
+          <a:prstGeom prst="round1Rect">
+            <a:avLst>
+              <a:gd name="adj" fmla="val 45280"/>
+            </a:avLst>
+          </a:prstGeom>
+          <a:solidFill>
+            <a:schemeClr val="bg2">
+              <a:lumMod val="10000"/>
+            </a:schemeClr>
+          </a:solidFill>
+          <a:ln>
+            <a:noFill/>
+          </a:ln>
+        </p:spPr>
+        <p:style>
+          <a:lnRef idx="2">
+            <a:schemeClr val="accent1">
+              <a:shade val="15000"/>
+            </a:schemeClr>
+          </a:lnRef>
+          <a:fillRef idx="1">
+            <a:schemeClr val="accent1"/>
+          </a:fillRef>
+          <a:effectRef idx="0">
+            <a:schemeClr val="accent1"/>
+          </a:effectRef>
+          <a:fontRef idx="minor">
+            <a:schemeClr val="lt1"/>
+          </a:fontRef>
+        </p:style>
+        <p:txBody>
+          <a:bodyPr rtlCol="0" anchor="ctr"/>
+          <a:lstStyle/>
+          <a:p>
+            <a:pPr algn="ctr"/>
+            <a:endParaRPr lang="pt-BR"/>
+          </a:p>
+        </p:txBody>
+      </p:sp>
+      <p:sp>
+        <p:nvSpPr>
+          <p:cNvPr id="15" name="Retângulo: Único Canto Arredondado 14">
+            <a:extLst>
+              <a:ext uri="{FF2B5EF4-FFF2-40B4-BE49-F238E27FC236}">
+                <a16:creationId xmlns:a16="http://schemas.microsoft.com/office/drawing/2014/main" id="{3A1D6D8D-EC66-921E-FF4C-6A3A22C8565A}"/>
+              </a:ext>
+            </a:extLst>
+          </p:cNvPr>
+          <p:cNvSpPr/>
+          <p:nvPr/>
+        </p:nvSpPr>
+        <p:spPr>
+          <a:xfrm rot="10800000">
+            <a:off x="11666088" y="757427"/>
+            <a:ext cx="402162" cy="277886"/>
+          </a:xfrm>
+          <a:prstGeom prst="round1Rect">
+            <a:avLst>
+              <a:gd name="adj" fmla="val 45280"/>
+            </a:avLst>
+          </a:prstGeom>
+          <a:solidFill>
+            <a:schemeClr val="bg1">
+              <a:lumMod val="85000"/>
+            </a:schemeClr>
+          </a:solidFill>
+          <a:ln>
+            <a:noFill/>
+          </a:ln>
+        </p:spPr>
+        <p:style>
+          <a:lnRef idx="2">
+            <a:schemeClr val="accent1">
+              <a:shade val="15000"/>
+            </a:schemeClr>
+          </a:lnRef>
+          <a:fillRef idx="1">
+            <a:schemeClr val="accent1"/>
+          </a:fillRef>
+          <a:effectRef idx="0">
+            <a:schemeClr val="accent1"/>
+          </a:effectRef>
+          <a:fontRef idx="minor">
+            <a:schemeClr val="lt1"/>
+          </a:fontRef>
+        </p:style>
+        <p:txBody>
+          <a:bodyPr rtlCol="0" anchor="ctr"/>
+          <a:lstStyle/>
+          <a:p>
+            <a:pPr algn="ctr"/>
+            <a:endParaRPr lang="pt-BR"/>
+          </a:p>
+        </p:txBody>
+      </p:sp>
+      <p:pic>
+        <p:nvPicPr>
+          <p:cNvPr id="28" name="Gráfico 27" descr="Relógio com preenchimento sólido">
+            <a:extLst>
+              <a:ext uri="{FF2B5EF4-FFF2-40B4-BE49-F238E27FC236}">
+                <a16:creationId xmlns:a16="http://schemas.microsoft.com/office/drawing/2014/main" id="{16CA6C13-6848-D7AC-1F43-D0D169DEA8B1}"/>
+              </a:ext>
+            </a:extLst>
+          </p:cNvPr>
+          <p:cNvPicPr>
+            <a:picLocks noChangeAspect="1"/>
+          </p:cNvPicPr>
+          <p:nvPr/>
+        </p:nvPicPr>
+        <p:blipFill>
+          <a:blip r:embed="rId4">
+            <a:extLst>
+              <a:ext uri="{96DAC541-7B7A-43D3-8B79-37D633B846F1}">
+                <asvg:svgBlip xmlns:asvg="http://schemas.microsoft.com/office/drawing/2016/SVG/main" r:embed="rId5"/>
+              </a:ext>
+            </a:extLst>
+          </a:blip>
+          <a:stretch>
+            <a:fillRect/>
+          </a:stretch>
+        </p:blipFill>
+        <p:spPr>
+          <a:xfrm>
+            <a:off x="11750169" y="778288"/>
+            <a:ext cx="234000" cy="234000"/>
+          </a:xfrm>
+          <a:prstGeom prst="rect">
+            <a:avLst/>
+          </a:prstGeom>
+        </p:spPr>
+      </p:pic>
+      <p:pic>
+        <p:nvPicPr>
+          <p:cNvPr id="30" name="Gráfico 29" descr="Seta circular com preenchimento sólido">
+            <a:extLst>
+              <a:ext uri="{FF2B5EF4-FFF2-40B4-BE49-F238E27FC236}">
+                <a16:creationId xmlns:a16="http://schemas.microsoft.com/office/drawing/2014/main" id="{5F9EF103-BCA5-8B76-FA2D-48E87D81C1C2}"/>
+              </a:ext>
+            </a:extLst>
+          </p:cNvPr>
+          <p:cNvPicPr>
+            <a:picLocks noChangeAspect="1"/>
+          </p:cNvPicPr>
+          <p:nvPr/>
+        </p:nvPicPr>
+        <p:blipFill>
+          <a:blip r:embed="rId6">
+            <a:extLst>
+              <a:ext uri="{96DAC541-7B7A-43D3-8B79-37D633B846F1}">
+                <asvg:svgBlip xmlns:asvg="http://schemas.microsoft.com/office/drawing/2016/SVG/main" r:embed="rId7"/>
+              </a:ext>
+            </a:extLst>
+          </a:blip>
+          <a:stretch>
+            <a:fillRect/>
+          </a:stretch>
+        </p:blipFill>
+        <p:spPr>
+          <a:xfrm>
+            <a:off x="2768648" y="794773"/>
+            <a:ext cx="234000" cy="234000"/>
+          </a:xfrm>
+          <a:prstGeom prst="rect">
+            <a:avLst/>
+          </a:prstGeom>
+        </p:spPr>
+      </p:pic>
+      <p:pic>
+        <p:nvPicPr>
+          <p:cNvPr id="34" name="Gráfico 33" descr="Símbolo de raiva com preenchimento sólido">
+            <a:extLst>
+              <a:ext uri="{FF2B5EF4-FFF2-40B4-BE49-F238E27FC236}">
+                <a16:creationId xmlns:a16="http://schemas.microsoft.com/office/drawing/2014/main" id="{70777EA6-23D7-7740-C7C9-D2C5DFBA347F}"/>
+              </a:ext>
+            </a:extLst>
+          </p:cNvPr>
+          <p:cNvPicPr>
+            <a:picLocks noChangeAspect="1"/>
+          </p:cNvPicPr>
+          <p:nvPr/>
+        </p:nvPicPr>
+        <p:blipFill>
+          <a:blip r:embed="rId8">
+            <a:extLst>
+              <a:ext uri="{96DAC541-7B7A-43D3-8B79-37D633B846F1}">
+                <asvg:svgBlip xmlns:asvg="http://schemas.microsoft.com/office/drawing/2016/SVG/main" r:embed="rId9"/>
+              </a:ext>
+            </a:extLst>
+          </a:blip>
+          <a:stretch>
+            <a:fillRect/>
+          </a:stretch>
+        </p:blipFill>
+        <p:spPr>
+          <a:xfrm>
+            <a:off x="8776420" y="778288"/>
+            <a:ext cx="234000" cy="234000"/>
+          </a:xfrm>
+          <a:prstGeom prst="rect">
+            <a:avLst/>
+          </a:prstGeom>
+        </p:spPr>
+      </p:pic>
+      <p:pic>
+        <p:nvPicPr>
+          <p:cNvPr id="36" name="Gráfico 35" descr="Marca de seleção com preenchimento sólido">
+            <a:extLst>
+              <a:ext uri="{FF2B5EF4-FFF2-40B4-BE49-F238E27FC236}">
+                <a16:creationId xmlns:a16="http://schemas.microsoft.com/office/drawing/2014/main" id="{B8FF45AD-27EF-4AE9-507C-96E9EA0C6724}"/>
+              </a:ext>
+            </a:extLst>
+          </p:cNvPr>
+          <p:cNvPicPr>
+            <a:picLocks noChangeAspect="1"/>
+          </p:cNvPicPr>
+          <p:nvPr/>
+        </p:nvPicPr>
+        <p:blipFill>
+          <a:blip r:embed="rId10">
+            <a:extLst>
+              <a:ext uri="{96DAC541-7B7A-43D3-8B79-37D633B846F1}">
+                <asvg:svgBlip xmlns:asvg="http://schemas.microsoft.com/office/drawing/2016/SVG/main" r:embed="rId11"/>
+              </a:ext>
+            </a:extLst>
+          </a:blip>
+          <a:stretch>
+            <a:fillRect/>
+          </a:stretch>
+        </p:blipFill>
+        <p:spPr>
+          <a:xfrm>
+            <a:off x="5794500" y="803637"/>
+            <a:ext cx="198000" cy="198000"/>
+          </a:xfrm>
+          <a:prstGeom prst="rect">
+            <a:avLst/>
+          </a:prstGeom>
+        </p:spPr>
+      </p:pic>
     </p:spTree>
     <p:extLst>
       <p:ext uri="{BB962C8B-B14F-4D97-AF65-F5344CB8AC3E}">

</xml_diff>

<commit_message>
Trocar as seções da página do dashboard
design: trocar as seções de mapa e análise de ocorrências
</commit_message>
<xml_diff>
--- a/design/model-screen.pptx
+++ b/design/model-screen.pptx
@@ -125,12 +125,12 @@
   <pc:docChgLst>
     <pc:chgData name="Matheus Ferreira" userId="6812419b9d4db205" providerId="LiveId" clId="{3686751A-7E85-438C-A520-65A5FC13965D}"/>
     <pc:docChg chg="undo custSel modSld">
-      <pc:chgData name="Matheus Ferreira" userId="6812419b9d4db205" providerId="LiveId" clId="{3686751A-7E85-438C-A520-65A5FC13965D}" dt="2026-01-23T17:44:31.571" v="137" actId="1076"/>
+      <pc:chgData name="Matheus Ferreira" userId="6812419b9d4db205" providerId="LiveId" clId="{3686751A-7E85-438C-A520-65A5FC13965D}" dt="2026-01-23T21:48:37.471" v="142" actId="14100"/>
       <pc:docMkLst>
         <pc:docMk/>
       </pc:docMkLst>
       <pc:sldChg chg="addSp delSp modSp mod">
-        <pc:chgData name="Matheus Ferreira" userId="6812419b9d4db205" providerId="LiveId" clId="{3686751A-7E85-438C-A520-65A5FC13965D}" dt="2026-01-23T17:44:31.571" v="137" actId="1076"/>
+        <pc:chgData name="Matheus Ferreira" userId="6812419b9d4db205" providerId="LiveId" clId="{3686751A-7E85-438C-A520-65A5FC13965D}" dt="2026-01-23T21:48:37.471" v="142" actId="14100"/>
         <pc:sldMkLst>
           <pc:docMk/>
           <pc:sldMk cId="3211902230" sldId="256"/>
@@ -144,7 +144,7 @@
           </ac:spMkLst>
         </pc:spChg>
         <pc:spChg chg="add mod">
-          <ac:chgData name="Matheus Ferreira" userId="6812419b9d4db205" providerId="LiveId" clId="{3686751A-7E85-438C-A520-65A5FC13965D}" dt="2026-01-23T17:15:18.824" v="5" actId="14861"/>
+          <ac:chgData name="Matheus Ferreira" userId="6812419b9d4db205" providerId="LiveId" clId="{3686751A-7E85-438C-A520-65A5FC13965D}" dt="2026-01-23T21:48:19.082" v="138" actId="14100"/>
           <ac:spMkLst>
             <pc:docMk/>
             <pc:sldMk cId="3211902230" sldId="256"/>
@@ -200,7 +200,7 @@
           </ac:spMkLst>
         </pc:spChg>
         <pc:spChg chg="mod">
-          <ac:chgData name="Matheus Ferreira" userId="6812419b9d4db205" providerId="LiveId" clId="{3686751A-7E85-438C-A520-65A5FC13965D}" dt="2026-01-23T17:23:22.661" v="51" actId="14861"/>
+          <ac:chgData name="Matheus Ferreira" userId="6812419b9d4db205" providerId="LiveId" clId="{3686751A-7E85-438C-A520-65A5FC13965D}" dt="2026-01-23T21:48:31.621" v="140" actId="14100"/>
           <ac:spMkLst>
             <pc:docMk/>
             <pc:sldMk cId="3211902230" sldId="256"/>
@@ -232,7 +232,7 @@
           </ac:spMkLst>
         </pc:spChg>
         <pc:spChg chg="mod">
-          <ac:chgData name="Matheus Ferreira" userId="6812419b9d4db205" providerId="LiveId" clId="{3686751A-7E85-438C-A520-65A5FC13965D}" dt="2026-01-23T17:28:31.229" v="89" actId="1076"/>
+          <ac:chgData name="Matheus Ferreira" userId="6812419b9d4db205" providerId="LiveId" clId="{3686751A-7E85-438C-A520-65A5FC13965D}" dt="2026-01-23T21:48:34.323" v="141" actId="14100"/>
           <ac:spMkLst>
             <pc:docMk/>
             <pc:sldMk cId="3211902230" sldId="256"/>
@@ -240,7 +240,7 @@
           </ac:spMkLst>
         </pc:spChg>
         <pc:spChg chg="mod">
-          <ac:chgData name="Matheus Ferreira" userId="6812419b9d4db205" providerId="LiveId" clId="{3686751A-7E85-438C-A520-65A5FC13965D}" dt="2026-01-23T17:23:48.927" v="57" actId="108"/>
+          <ac:chgData name="Matheus Ferreira" userId="6812419b9d4db205" providerId="LiveId" clId="{3686751A-7E85-438C-A520-65A5FC13965D}" dt="2026-01-23T21:48:37.471" v="142" actId="14100"/>
           <ac:spMkLst>
             <pc:docMk/>
             <pc:sldMk cId="3211902230" sldId="256"/>
@@ -248,7 +248,7 @@
           </ac:spMkLst>
         </pc:spChg>
         <pc:spChg chg="mod">
-          <ac:chgData name="Matheus Ferreira" userId="6812419b9d4db205" providerId="LiveId" clId="{3686751A-7E85-438C-A520-65A5FC13965D}" dt="2026-01-23T17:40:12.035" v="125" actId="1076"/>
+          <ac:chgData name="Matheus Ferreira" userId="6812419b9d4db205" providerId="LiveId" clId="{3686751A-7E85-438C-A520-65A5FC13965D}" dt="2026-01-23T21:48:27.481" v="139" actId="14100"/>
           <ac:spMkLst>
             <pc:docMk/>
             <pc:sldMk cId="3211902230" sldId="256"/>
@@ -3663,8 +3663,8 @@
         </p:nvSpPr>
         <p:spPr>
           <a:xfrm>
-            <a:off x="198000" y="767131"/>
-            <a:ext cx="2890498" cy="1117950"/>
+            <a:off x="123750" y="767131"/>
+            <a:ext cx="2964748" cy="1117950"/>
           </a:xfrm>
           <a:prstGeom prst="roundRect">
             <a:avLst>
@@ -3911,8 +3911,8 @@
         </p:nvSpPr>
         <p:spPr>
           <a:xfrm>
-            <a:off x="207001" y="2083081"/>
-            <a:ext cx="5879998" cy="2238907"/>
+            <a:off x="123750" y="2083081"/>
+            <a:ext cx="5963249" cy="2238907"/>
           </a:xfrm>
           <a:prstGeom prst="roundRect">
             <a:avLst>
@@ -3973,8 +3973,8 @@
         </p:nvSpPr>
         <p:spPr>
           <a:xfrm>
-            <a:off x="198000" y="4421093"/>
-            <a:ext cx="5879998" cy="2238907"/>
+            <a:off x="123750" y="4421093"/>
+            <a:ext cx="5954248" cy="2238907"/>
           </a:xfrm>
           <a:prstGeom prst="roundRect">
             <a:avLst>
@@ -4036,7 +4036,7 @@
         <p:spPr>
           <a:xfrm>
             <a:off x="6204002" y="2057300"/>
-            <a:ext cx="5789997" cy="4622294"/>
+            <a:ext cx="5864248" cy="4622294"/>
           </a:xfrm>
           <a:prstGeom prst="roundRect">
             <a:avLst>
@@ -4098,7 +4098,7 @@
         <p:spPr>
           <a:xfrm>
             <a:off x="0" y="0"/>
-            <a:ext cx="12068250" cy="588725"/>
+            <a:ext cx="12192000" cy="588725"/>
           </a:xfrm>
           <a:prstGeom prst="roundRect">
             <a:avLst>

</xml_diff>